<commit_message>
Cores funcionando e temperaturas
Adicionado cores aos tanques, linkado também a temperatura. TOP TOP
</commit_message>
<xml_diff>
--- a/Enxuto/Apresentação1.pptx
+++ b/Enxuto/Apresentação1.pptx
@@ -6,6 +6,7 @@
   </p:sldMasterIdLst>
   <p:sldIdLst>
     <p:sldId id="256" r:id="rId2"/>
+    <p:sldId id="257" r:id="rId3"/>
   </p:sldIdLst>
   <p:sldSz cx="12192000" cy="6858000"/>
   <p:notesSz cx="6858000" cy="9144000"/>
@@ -104,6 +105,11 @@
       </a:defRPr>
     </a:lvl9pPr>
   </p:defaultTextStyle>
+  <p:extLst>
+    <p:ext uri="{EFAFB233-063F-42B5-8137-9DF3F51BA10A}">
+      <p15:sldGuideLst xmlns:p15="http://schemas.microsoft.com/office/powerpoint/2012/main"/>
+    </p:ext>
+  </p:extLst>
 </p:presentation>
 </file>
 
@@ -254,7 +260,7 @@
           <a:p>
             <a:fld id="{42CC806E-3FE6-4825-BD05-017A1C435B64}" type="datetimeFigureOut">
               <a:rPr lang="pt-BR" smtClean="0"/>
-              <a:t>15/05/2020</a:t>
+              <a:t>17/05/2020</a:t>
             </a:fld>
             <a:endParaRPr lang="pt-BR"/>
           </a:p>
@@ -452,7 +458,7 @@
           <a:p>
             <a:fld id="{42CC806E-3FE6-4825-BD05-017A1C435B64}" type="datetimeFigureOut">
               <a:rPr lang="pt-BR" smtClean="0"/>
-              <a:t>15/05/2020</a:t>
+              <a:t>17/05/2020</a:t>
             </a:fld>
             <a:endParaRPr lang="pt-BR"/>
           </a:p>
@@ -660,7 +666,7 @@
           <a:p>
             <a:fld id="{42CC806E-3FE6-4825-BD05-017A1C435B64}" type="datetimeFigureOut">
               <a:rPr lang="pt-BR" smtClean="0"/>
-              <a:t>15/05/2020</a:t>
+              <a:t>17/05/2020</a:t>
             </a:fld>
             <a:endParaRPr lang="pt-BR"/>
           </a:p>
@@ -858,7 +864,7 @@
           <a:p>
             <a:fld id="{42CC806E-3FE6-4825-BD05-017A1C435B64}" type="datetimeFigureOut">
               <a:rPr lang="pt-BR" smtClean="0"/>
-              <a:t>15/05/2020</a:t>
+              <a:t>17/05/2020</a:t>
             </a:fld>
             <a:endParaRPr lang="pt-BR"/>
           </a:p>
@@ -1133,7 +1139,7 @@
           <a:p>
             <a:fld id="{42CC806E-3FE6-4825-BD05-017A1C435B64}" type="datetimeFigureOut">
               <a:rPr lang="pt-BR" smtClean="0"/>
-              <a:t>15/05/2020</a:t>
+              <a:t>17/05/2020</a:t>
             </a:fld>
             <a:endParaRPr lang="pt-BR"/>
           </a:p>
@@ -1398,7 +1404,7 @@
           <a:p>
             <a:fld id="{42CC806E-3FE6-4825-BD05-017A1C435B64}" type="datetimeFigureOut">
               <a:rPr lang="pt-BR" smtClean="0"/>
-              <a:t>15/05/2020</a:t>
+              <a:t>17/05/2020</a:t>
             </a:fld>
             <a:endParaRPr lang="pt-BR"/>
           </a:p>
@@ -1810,7 +1816,7 @@
           <a:p>
             <a:fld id="{42CC806E-3FE6-4825-BD05-017A1C435B64}" type="datetimeFigureOut">
               <a:rPr lang="pt-BR" smtClean="0"/>
-              <a:t>15/05/2020</a:t>
+              <a:t>17/05/2020</a:t>
             </a:fld>
             <a:endParaRPr lang="pt-BR"/>
           </a:p>
@@ -1951,7 +1957,7 @@
           <a:p>
             <a:fld id="{42CC806E-3FE6-4825-BD05-017A1C435B64}" type="datetimeFigureOut">
               <a:rPr lang="pt-BR" smtClean="0"/>
-              <a:t>15/05/2020</a:t>
+              <a:t>17/05/2020</a:t>
             </a:fld>
             <a:endParaRPr lang="pt-BR"/>
           </a:p>
@@ -2064,7 +2070,7 @@
           <a:p>
             <a:fld id="{42CC806E-3FE6-4825-BD05-017A1C435B64}" type="datetimeFigureOut">
               <a:rPr lang="pt-BR" smtClean="0"/>
-              <a:t>15/05/2020</a:t>
+              <a:t>17/05/2020</a:t>
             </a:fld>
             <a:endParaRPr lang="pt-BR"/>
           </a:p>
@@ -2375,7 +2381,7 @@
           <a:p>
             <a:fld id="{42CC806E-3FE6-4825-BD05-017A1C435B64}" type="datetimeFigureOut">
               <a:rPr lang="pt-BR" smtClean="0"/>
-              <a:t>15/05/2020</a:t>
+              <a:t>17/05/2020</a:t>
             </a:fld>
             <a:endParaRPr lang="pt-BR"/>
           </a:p>
@@ -2663,7 +2669,7 @@
           <a:p>
             <a:fld id="{42CC806E-3FE6-4825-BD05-017A1C435B64}" type="datetimeFigureOut">
               <a:rPr lang="pt-BR" smtClean="0"/>
-              <a:t>15/05/2020</a:t>
+              <a:t>17/05/2020</a:t>
             </a:fld>
             <a:endParaRPr lang="pt-BR"/>
           </a:p>
@@ -2904,7 +2910,7 @@
           <a:p>
             <a:fld id="{42CC806E-3FE6-4825-BD05-017A1C435B64}" type="datetimeFigureOut">
               <a:rPr lang="pt-BR" smtClean="0"/>
-              <a:t>15/05/2020</a:t>
+              <a:t>17/05/2020</a:t>
             </a:fld>
             <a:endParaRPr lang="pt-BR"/>
           </a:p>
@@ -3323,10 +3329,10 @@
       </p:grpSpPr>
       <p:sp>
         <p:nvSpPr>
-          <p:cNvPr id="4" name="Fluxograma: Documento 3">
-            <a:extLst>
-              <a:ext uri="{FF2B5EF4-FFF2-40B4-BE49-F238E27FC236}">
-                <a16:creationId xmlns:a16="http://schemas.microsoft.com/office/drawing/2014/main" id="{4841EF14-7AF8-4BE6-943D-C141954F60DC}"/>
+          <p:cNvPr id="14" name="Fluxograma: Documento 3">
+            <a:extLst>
+              <a:ext uri="{FF2B5EF4-FFF2-40B4-BE49-F238E27FC236}">
+                <a16:creationId xmlns:a16="http://schemas.microsoft.com/office/drawing/2014/main" id="{1A410F41-3EA4-48C3-BFED-2F7C41825FBE}"/>
               </a:ext>
             </a:extLst>
           </p:cNvPr>
@@ -3335,7 +3341,202 @@
         </p:nvSpPr>
         <p:spPr>
           <a:xfrm rot="10800000">
-            <a:off x="2163651" y="800398"/>
+            <a:off x="-13244" y="1751527"/>
+            <a:ext cx="5139400" cy="4455496"/>
+          </a:xfrm>
+          <a:custGeom>
+            <a:avLst/>
+            <a:gdLst>
+              <a:gd name="connsiteX0" fmla="*/ 0 w 21600"/>
+              <a:gd name="connsiteY0" fmla="*/ 0 h 21600"/>
+              <a:gd name="connsiteX1" fmla="*/ 21600 w 21600"/>
+              <a:gd name="connsiteY1" fmla="*/ 0 h 21600"/>
+              <a:gd name="connsiteX2" fmla="*/ 21600 w 21600"/>
+              <a:gd name="connsiteY2" fmla="*/ 17322 h 21600"/>
+              <a:gd name="connsiteX3" fmla="*/ 0 w 21600"/>
+              <a:gd name="connsiteY3" fmla="*/ 20172 h 21600"/>
+              <a:gd name="connsiteX4" fmla="*/ 0 w 21600"/>
+              <a:gd name="connsiteY4" fmla="*/ 0 h 21600"/>
+              <a:gd name="connsiteX0" fmla="*/ 0 w 21600"/>
+              <a:gd name="connsiteY0" fmla="*/ 0 h 19100"/>
+              <a:gd name="connsiteX1" fmla="*/ 21600 w 21600"/>
+              <a:gd name="connsiteY1" fmla="*/ 0 h 19100"/>
+              <a:gd name="connsiteX2" fmla="*/ 21600 w 21600"/>
+              <a:gd name="connsiteY2" fmla="*/ 17322 h 19100"/>
+              <a:gd name="connsiteX3" fmla="*/ 0 w 21600"/>
+              <a:gd name="connsiteY3" fmla="*/ 17472 h 19100"/>
+              <a:gd name="connsiteX4" fmla="*/ 0 w 21600"/>
+              <a:gd name="connsiteY4" fmla="*/ 0 h 19100"/>
+              <a:gd name="connsiteX0" fmla="*/ 0 w 21600"/>
+              <a:gd name="connsiteY0" fmla="*/ 0 h 18697"/>
+              <a:gd name="connsiteX1" fmla="*/ 21600 w 21600"/>
+              <a:gd name="connsiteY1" fmla="*/ 0 h 18697"/>
+              <a:gd name="connsiteX2" fmla="*/ 21600 w 21600"/>
+              <a:gd name="connsiteY2" fmla="*/ 17322 h 18697"/>
+              <a:gd name="connsiteX3" fmla="*/ 0 w 21600"/>
+              <a:gd name="connsiteY3" fmla="*/ 17472 h 18697"/>
+              <a:gd name="connsiteX4" fmla="*/ 0 w 21600"/>
+              <a:gd name="connsiteY4" fmla="*/ 0 h 18697"/>
+              <a:gd name="connsiteX0" fmla="*/ 0 w 21600"/>
+              <a:gd name="connsiteY0" fmla="*/ 0 h 18712"/>
+              <a:gd name="connsiteX1" fmla="*/ 21600 w 21600"/>
+              <a:gd name="connsiteY1" fmla="*/ 0 h 18712"/>
+              <a:gd name="connsiteX2" fmla="*/ 21600 w 21600"/>
+              <a:gd name="connsiteY2" fmla="*/ 17422 h 18712"/>
+              <a:gd name="connsiteX3" fmla="*/ 0 w 21600"/>
+              <a:gd name="connsiteY3" fmla="*/ 17472 h 18712"/>
+              <a:gd name="connsiteX4" fmla="*/ 0 w 21600"/>
+              <a:gd name="connsiteY4" fmla="*/ 0 h 18712"/>
+              <a:gd name="connsiteX0" fmla="*/ 0 w 21600"/>
+              <a:gd name="connsiteY0" fmla="*/ 0 h 18721"/>
+              <a:gd name="connsiteX1" fmla="*/ 21600 w 21600"/>
+              <a:gd name="connsiteY1" fmla="*/ 0 h 18721"/>
+              <a:gd name="connsiteX2" fmla="*/ 21600 w 21600"/>
+              <a:gd name="connsiteY2" fmla="*/ 17482 h 18721"/>
+              <a:gd name="connsiteX3" fmla="*/ 0 w 21600"/>
+              <a:gd name="connsiteY3" fmla="*/ 17472 h 18721"/>
+              <a:gd name="connsiteX4" fmla="*/ 0 w 21600"/>
+              <a:gd name="connsiteY4" fmla="*/ 0 h 18721"/>
+              <a:gd name="connsiteX0" fmla="*/ 0 w 21600"/>
+              <a:gd name="connsiteY0" fmla="*/ 0 h 18670"/>
+              <a:gd name="connsiteX1" fmla="*/ 21600 w 21600"/>
+              <a:gd name="connsiteY1" fmla="*/ 0 h 18670"/>
+              <a:gd name="connsiteX2" fmla="*/ 21600 w 21600"/>
+              <a:gd name="connsiteY2" fmla="*/ 17482 h 18670"/>
+              <a:gd name="connsiteX3" fmla="*/ 0 w 21600"/>
+              <a:gd name="connsiteY3" fmla="*/ 17472 h 18670"/>
+              <a:gd name="connsiteX4" fmla="*/ 0 w 21600"/>
+              <a:gd name="connsiteY4" fmla="*/ 0 h 18670"/>
+              <a:gd name="connsiteX0" fmla="*/ 0 w 21600"/>
+              <a:gd name="connsiteY0" fmla="*/ 0 h 18728"/>
+              <a:gd name="connsiteX1" fmla="*/ 21600 w 21600"/>
+              <a:gd name="connsiteY1" fmla="*/ 0 h 18728"/>
+              <a:gd name="connsiteX2" fmla="*/ 21600 w 21600"/>
+              <a:gd name="connsiteY2" fmla="*/ 17482 h 18728"/>
+              <a:gd name="connsiteX3" fmla="*/ 0 w 21600"/>
+              <a:gd name="connsiteY3" fmla="*/ 17472 h 18728"/>
+              <a:gd name="connsiteX4" fmla="*/ 0 w 21600"/>
+              <a:gd name="connsiteY4" fmla="*/ 0 h 18728"/>
+              <a:gd name="connsiteX0" fmla="*/ 0 w 21600"/>
+              <a:gd name="connsiteY0" fmla="*/ 0 h 18067"/>
+              <a:gd name="connsiteX1" fmla="*/ 21600 w 21600"/>
+              <a:gd name="connsiteY1" fmla="*/ 0 h 18067"/>
+              <a:gd name="connsiteX2" fmla="*/ 21600 w 21600"/>
+              <a:gd name="connsiteY2" fmla="*/ 17482 h 18067"/>
+              <a:gd name="connsiteX3" fmla="*/ 0 w 21600"/>
+              <a:gd name="connsiteY3" fmla="*/ 17472 h 18067"/>
+              <a:gd name="connsiteX4" fmla="*/ 0 w 21600"/>
+              <a:gd name="connsiteY4" fmla="*/ 0 h 18067"/>
+              <a:gd name="connsiteX0" fmla="*/ 0 w 21600"/>
+              <a:gd name="connsiteY0" fmla="*/ 0 h 17788"/>
+              <a:gd name="connsiteX1" fmla="*/ 21600 w 21600"/>
+              <a:gd name="connsiteY1" fmla="*/ 0 h 17788"/>
+              <a:gd name="connsiteX2" fmla="*/ 21600 w 21600"/>
+              <a:gd name="connsiteY2" fmla="*/ 17482 h 17788"/>
+              <a:gd name="connsiteX3" fmla="*/ 0 w 21600"/>
+              <a:gd name="connsiteY3" fmla="*/ 17472 h 17788"/>
+              <a:gd name="connsiteX4" fmla="*/ 0 w 21600"/>
+              <a:gd name="connsiteY4" fmla="*/ 0 h 17788"/>
+              <a:gd name="connsiteX0" fmla="*/ 0 w 21600"/>
+              <a:gd name="connsiteY0" fmla="*/ 0 h 17883"/>
+              <a:gd name="connsiteX1" fmla="*/ 21600 w 21600"/>
+              <a:gd name="connsiteY1" fmla="*/ 0 h 17883"/>
+              <a:gd name="connsiteX2" fmla="*/ 21600 w 21600"/>
+              <a:gd name="connsiteY2" fmla="*/ 17482 h 17883"/>
+              <a:gd name="connsiteX3" fmla="*/ 0 w 21600"/>
+              <a:gd name="connsiteY3" fmla="*/ 17472 h 17883"/>
+              <a:gd name="connsiteX4" fmla="*/ 0 w 21600"/>
+              <a:gd name="connsiteY4" fmla="*/ 0 h 17883"/>
+            </a:gdLst>
+            <a:ahLst/>
+            <a:cxnLst>
+              <a:cxn ang="0">
+                <a:pos x="connsiteX0" y="connsiteY0"/>
+              </a:cxn>
+              <a:cxn ang="0">
+                <a:pos x="connsiteX1" y="connsiteY1"/>
+              </a:cxn>
+              <a:cxn ang="0">
+                <a:pos x="connsiteX2" y="connsiteY2"/>
+              </a:cxn>
+              <a:cxn ang="0">
+                <a:pos x="connsiteX3" y="connsiteY3"/>
+              </a:cxn>
+              <a:cxn ang="0">
+                <a:pos x="connsiteX4" y="connsiteY4"/>
+              </a:cxn>
+            </a:cxnLst>
+            <a:rect l="l" t="t" r="r" b="b"/>
+            <a:pathLst>
+              <a:path w="21600" h="17883">
+                <a:moveTo>
+                  <a:pt x="0" y="0"/>
+                </a:moveTo>
+                <a:lnTo>
+                  <a:pt x="21600" y="0"/>
+                </a:lnTo>
+                <a:lnTo>
+                  <a:pt x="21600" y="17482"/>
+                </a:lnTo>
+                <a:cubicBezTo>
+                  <a:pt x="14839" y="16235"/>
+                  <a:pt x="7520" y="18846"/>
+                  <a:pt x="0" y="17472"/>
+                </a:cubicBezTo>
+                <a:lnTo>
+                  <a:pt x="0" y="0"/>
+                </a:lnTo>
+                <a:close/>
+              </a:path>
+            </a:pathLst>
+          </a:custGeom>
+          <a:solidFill>
+            <a:schemeClr val="tx1"/>
+          </a:solidFill>
+          <a:ln>
+            <a:noFill/>
+          </a:ln>
+        </p:spPr>
+        <p:style>
+          <a:lnRef idx="2">
+            <a:schemeClr val="accent1">
+              <a:shade val="50000"/>
+            </a:schemeClr>
+          </a:lnRef>
+          <a:fillRef idx="1">
+            <a:schemeClr val="accent1"/>
+          </a:fillRef>
+          <a:effectRef idx="0">
+            <a:schemeClr val="accent1"/>
+          </a:effectRef>
+          <a:fontRef idx="minor">
+            <a:schemeClr val="lt1"/>
+          </a:fontRef>
+        </p:style>
+        <p:txBody>
+          <a:bodyPr rtlCol="0" anchor="ctr"/>
+          <a:lstStyle/>
+          <a:p>
+            <a:pPr algn="ctr"/>
+            <a:endParaRPr lang="pt-BR"/>
+          </a:p>
+        </p:txBody>
+      </p:sp>
+      <p:sp>
+        <p:nvSpPr>
+          <p:cNvPr id="4" name="Fluxograma: Documento 3">
+            <a:extLst>
+              <a:ext uri="{FF2B5EF4-FFF2-40B4-BE49-F238E27FC236}">
+                <a16:creationId xmlns:a16="http://schemas.microsoft.com/office/drawing/2014/main" id="{4841EF14-7AF8-4BE6-943D-C141954F60DC}"/>
+              </a:ext>
+            </a:extLst>
+          </p:cNvPr>
+          <p:cNvSpPr/>
+          <p:nvPr/>
+        </p:nvSpPr>
+        <p:spPr>
+          <a:xfrm rot="10800000">
+            <a:off x="2163651" y="192714"/>
             <a:ext cx="2459864" cy="2277653"/>
           </a:xfrm>
           <a:custGeom>
@@ -3450,7 +3651,202 @@
         </p:nvSpPr>
         <p:spPr>
           <a:xfrm rot="10800000">
-            <a:off x="4623515" y="851674"/>
+            <a:off x="4623515" y="337838"/>
+            <a:ext cx="2459864" cy="2132528"/>
+          </a:xfrm>
+          <a:custGeom>
+            <a:avLst/>
+            <a:gdLst>
+              <a:gd name="connsiteX0" fmla="*/ 0 w 21600"/>
+              <a:gd name="connsiteY0" fmla="*/ 0 h 21600"/>
+              <a:gd name="connsiteX1" fmla="*/ 21600 w 21600"/>
+              <a:gd name="connsiteY1" fmla="*/ 0 h 21600"/>
+              <a:gd name="connsiteX2" fmla="*/ 21600 w 21600"/>
+              <a:gd name="connsiteY2" fmla="*/ 17322 h 21600"/>
+              <a:gd name="connsiteX3" fmla="*/ 0 w 21600"/>
+              <a:gd name="connsiteY3" fmla="*/ 20172 h 21600"/>
+              <a:gd name="connsiteX4" fmla="*/ 0 w 21600"/>
+              <a:gd name="connsiteY4" fmla="*/ 0 h 21600"/>
+              <a:gd name="connsiteX0" fmla="*/ 0 w 21600"/>
+              <a:gd name="connsiteY0" fmla="*/ 0 h 19100"/>
+              <a:gd name="connsiteX1" fmla="*/ 21600 w 21600"/>
+              <a:gd name="connsiteY1" fmla="*/ 0 h 19100"/>
+              <a:gd name="connsiteX2" fmla="*/ 21600 w 21600"/>
+              <a:gd name="connsiteY2" fmla="*/ 17322 h 19100"/>
+              <a:gd name="connsiteX3" fmla="*/ 0 w 21600"/>
+              <a:gd name="connsiteY3" fmla="*/ 17472 h 19100"/>
+              <a:gd name="connsiteX4" fmla="*/ 0 w 21600"/>
+              <a:gd name="connsiteY4" fmla="*/ 0 h 19100"/>
+              <a:gd name="connsiteX0" fmla="*/ 0 w 21600"/>
+              <a:gd name="connsiteY0" fmla="*/ 0 h 18697"/>
+              <a:gd name="connsiteX1" fmla="*/ 21600 w 21600"/>
+              <a:gd name="connsiteY1" fmla="*/ 0 h 18697"/>
+              <a:gd name="connsiteX2" fmla="*/ 21600 w 21600"/>
+              <a:gd name="connsiteY2" fmla="*/ 17322 h 18697"/>
+              <a:gd name="connsiteX3" fmla="*/ 0 w 21600"/>
+              <a:gd name="connsiteY3" fmla="*/ 17472 h 18697"/>
+              <a:gd name="connsiteX4" fmla="*/ 0 w 21600"/>
+              <a:gd name="connsiteY4" fmla="*/ 0 h 18697"/>
+              <a:gd name="connsiteX0" fmla="*/ 0 w 21600"/>
+              <a:gd name="connsiteY0" fmla="*/ 0 h 18712"/>
+              <a:gd name="connsiteX1" fmla="*/ 21600 w 21600"/>
+              <a:gd name="connsiteY1" fmla="*/ 0 h 18712"/>
+              <a:gd name="connsiteX2" fmla="*/ 21600 w 21600"/>
+              <a:gd name="connsiteY2" fmla="*/ 17422 h 18712"/>
+              <a:gd name="connsiteX3" fmla="*/ 0 w 21600"/>
+              <a:gd name="connsiteY3" fmla="*/ 17472 h 18712"/>
+              <a:gd name="connsiteX4" fmla="*/ 0 w 21600"/>
+              <a:gd name="connsiteY4" fmla="*/ 0 h 18712"/>
+              <a:gd name="connsiteX0" fmla="*/ 0 w 21600"/>
+              <a:gd name="connsiteY0" fmla="*/ 0 h 18721"/>
+              <a:gd name="connsiteX1" fmla="*/ 21600 w 21600"/>
+              <a:gd name="connsiteY1" fmla="*/ 0 h 18721"/>
+              <a:gd name="connsiteX2" fmla="*/ 21600 w 21600"/>
+              <a:gd name="connsiteY2" fmla="*/ 17482 h 18721"/>
+              <a:gd name="connsiteX3" fmla="*/ 0 w 21600"/>
+              <a:gd name="connsiteY3" fmla="*/ 17472 h 18721"/>
+              <a:gd name="connsiteX4" fmla="*/ 0 w 21600"/>
+              <a:gd name="connsiteY4" fmla="*/ 0 h 18721"/>
+              <a:gd name="connsiteX0" fmla="*/ 0 w 21600"/>
+              <a:gd name="connsiteY0" fmla="*/ 0 h 18670"/>
+              <a:gd name="connsiteX1" fmla="*/ 21600 w 21600"/>
+              <a:gd name="connsiteY1" fmla="*/ 0 h 18670"/>
+              <a:gd name="connsiteX2" fmla="*/ 21600 w 21600"/>
+              <a:gd name="connsiteY2" fmla="*/ 17482 h 18670"/>
+              <a:gd name="connsiteX3" fmla="*/ 0 w 21600"/>
+              <a:gd name="connsiteY3" fmla="*/ 17472 h 18670"/>
+              <a:gd name="connsiteX4" fmla="*/ 0 w 21600"/>
+              <a:gd name="connsiteY4" fmla="*/ 0 h 18670"/>
+              <a:gd name="connsiteX0" fmla="*/ 0 w 21600"/>
+              <a:gd name="connsiteY0" fmla="*/ 0 h 18728"/>
+              <a:gd name="connsiteX1" fmla="*/ 21600 w 21600"/>
+              <a:gd name="connsiteY1" fmla="*/ 0 h 18728"/>
+              <a:gd name="connsiteX2" fmla="*/ 21600 w 21600"/>
+              <a:gd name="connsiteY2" fmla="*/ 17482 h 18728"/>
+              <a:gd name="connsiteX3" fmla="*/ 0 w 21600"/>
+              <a:gd name="connsiteY3" fmla="*/ 17472 h 18728"/>
+              <a:gd name="connsiteX4" fmla="*/ 0 w 21600"/>
+              <a:gd name="connsiteY4" fmla="*/ 0 h 18728"/>
+              <a:gd name="connsiteX0" fmla="*/ 0 w 21600"/>
+              <a:gd name="connsiteY0" fmla="*/ 0 h 18067"/>
+              <a:gd name="connsiteX1" fmla="*/ 21600 w 21600"/>
+              <a:gd name="connsiteY1" fmla="*/ 0 h 18067"/>
+              <a:gd name="connsiteX2" fmla="*/ 21600 w 21600"/>
+              <a:gd name="connsiteY2" fmla="*/ 17482 h 18067"/>
+              <a:gd name="connsiteX3" fmla="*/ 0 w 21600"/>
+              <a:gd name="connsiteY3" fmla="*/ 17472 h 18067"/>
+              <a:gd name="connsiteX4" fmla="*/ 0 w 21600"/>
+              <a:gd name="connsiteY4" fmla="*/ 0 h 18067"/>
+              <a:gd name="connsiteX0" fmla="*/ 0 w 21600"/>
+              <a:gd name="connsiteY0" fmla="*/ 0 h 17788"/>
+              <a:gd name="connsiteX1" fmla="*/ 21600 w 21600"/>
+              <a:gd name="connsiteY1" fmla="*/ 0 h 17788"/>
+              <a:gd name="connsiteX2" fmla="*/ 21600 w 21600"/>
+              <a:gd name="connsiteY2" fmla="*/ 17482 h 17788"/>
+              <a:gd name="connsiteX3" fmla="*/ 0 w 21600"/>
+              <a:gd name="connsiteY3" fmla="*/ 17472 h 17788"/>
+              <a:gd name="connsiteX4" fmla="*/ 0 w 21600"/>
+              <a:gd name="connsiteY4" fmla="*/ 0 h 17788"/>
+              <a:gd name="connsiteX0" fmla="*/ 0 w 21600"/>
+              <a:gd name="connsiteY0" fmla="*/ 0 h 17883"/>
+              <a:gd name="connsiteX1" fmla="*/ 21600 w 21600"/>
+              <a:gd name="connsiteY1" fmla="*/ 0 h 17883"/>
+              <a:gd name="connsiteX2" fmla="*/ 21600 w 21600"/>
+              <a:gd name="connsiteY2" fmla="*/ 17482 h 17883"/>
+              <a:gd name="connsiteX3" fmla="*/ 0 w 21600"/>
+              <a:gd name="connsiteY3" fmla="*/ 17472 h 17883"/>
+              <a:gd name="connsiteX4" fmla="*/ 0 w 21600"/>
+              <a:gd name="connsiteY4" fmla="*/ 0 h 17883"/>
+            </a:gdLst>
+            <a:ahLst/>
+            <a:cxnLst>
+              <a:cxn ang="0">
+                <a:pos x="connsiteX0" y="connsiteY0"/>
+              </a:cxn>
+              <a:cxn ang="0">
+                <a:pos x="connsiteX1" y="connsiteY1"/>
+              </a:cxn>
+              <a:cxn ang="0">
+                <a:pos x="connsiteX2" y="connsiteY2"/>
+              </a:cxn>
+              <a:cxn ang="0">
+                <a:pos x="connsiteX3" y="connsiteY3"/>
+              </a:cxn>
+              <a:cxn ang="0">
+                <a:pos x="connsiteX4" y="connsiteY4"/>
+              </a:cxn>
+            </a:cxnLst>
+            <a:rect l="l" t="t" r="r" b="b"/>
+            <a:pathLst>
+              <a:path w="21600" h="17883">
+                <a:moveTo>
+                  <a:pt x="0" y="0"/>
+                </a:moveTo>
+                <a:lnTo>
+                  <a:pt x="21600" y="0"/>
+                </a:lnTo>
+                <a:lnTo>
+                  <a:pt x="21600" y="17482"/>
+                </a:lnTo>
+                <a:cubicBezTo>
+                  <a:pt x="14839" y="16235"/>
+                  <a:pt x="7520" y="18846"/>
+                  <a:pt x="0" y="17472"/>
+                </a:cubicBezTo>
+                <a:lnTo>
+                  <a:pt x="0" y="0"/>
+                </a:lnTo>
+                <a:close/>
+              </a:path>
+            </a:pathLst>
+          </a:custGeom>
+          <a:solidFill>
+            <a:srgbClr val="0070C0"/>
+          </a:solidFill>
+          <a:ln>
+            <a:noFill/>
+          </a:ln>
+        </p:spPr>
+        <p:style>
+          <a:lnRef idx="2">
+            <a:schemeClr val="accent1">
+              <a:shade val="50000"/>
+            </a:schemeClr>
+          </a:lnRef>
+          <a:fillRef idx="1">
+            <a:schemeClr val="accent1"/>
+          </a:fillRef>
+          <a:effectRef idx="0">
+            <a:schemeClr val="accent1"/>
+          </a:effectRef>
+          <a:fontRef idx="minor">
+            <a:schemeClr val="lt1"/>
+          </a:fontRef>
+        </p:style>
+        <p:txBody>
+          <a:bodyPr rtlCol="0" anchor="ctr"/>
+          <a:lstStyle/>
+          <a:p>
+            <a:pPr algn="ctr"/>
+            <a:endParaRPr lang="pt-BR"/>
+          </a:p>
+        </p:txBody>
+      </p:sp>
+      <p:sp>
+        <p:nvSpPr>
+          <p:cNvPr id="6" name="Fluxograma: Documento 3">
+            <a:extLst>
+              <a:ext uri="{FF2B5EF4-FFF2-40B4-BE49-F238E27FC236}">
+                <a16:creationId xmlns:a16="http://schemas.microsoft.com/office/drawing/2014/main" id="{10B3977F-9B64-402E-9A7F-845DC3EADBB5}"/>
+              </a:ext>
+            </a:extLst>
+          </p:cNvPr>
+          <p:cNvSpPr/>
+          <p:nvPr/>
+        </p:nvSpPr>
+        <p:spPr>
+          <a:xfrm rot="10800000">
+            <a:off x="7083379" y="243988"/>
             <a:ext cx="2459864" cy="2226376"/>
           </a:xfrm>
           <a:custGeom>
@@ -3593,10 +3989,10 @@
       </p:sp>
       <p:sp>
         <p:nvSpPr>
-          <p:cNvPr id="6" name="Fluxograma: Documento 3">
-            <a:extLst>
-              <a:ext uri="{FF2B5EF4-FFF2-40B4-BE49-F238E27FC236}">
-                <a16:creationId xmlns:a16="http://schemas.microsoft.com/office/drawing/2014/main" id="{10B3977F-9B64-402E-9A7F-845DC3EADBB5}"/>
+          <p:cNvPr id="9" name="Fluxograma: Documento 3">
+            <a:extLst>
+              <a:ext uri="{FF2B5EF4-FFF2-40B4-BE49-F238E27FC236}">
+                <a16:creationId xmlns:a16="http://schemas.microsoft.com/office/drawing/2014/main" id="{75EEFC5B-5F34-466C-9DCB-CC71A20A6A7D}"/>
               </a:ext>
             </a:extLst>
           </p:cNvPr>
@@ -3605,8 +4001,8 @@
         </p:nvSpPr>
         <p:spPr>
           <a:xfrm rot="10800000">
-            <a:off x="7083379" y="851672"/>
-            <a:ext cx="2459864" cy="2226376"/>
+            <a:off x="6096000" y="2760611"/>
+            <a:ext cx="2459864" cy="2132528"/>
           </a:xfrm>
           <a:custGeom>
             <a:avLst/>
@@ -3671,6 +4067,46 @@
               <a:gd name="connsiteY3" fmla="*/ 17472 h 18670"/>
               <a:gd name="connsiteX4" fmla="*/ 0 w 21600"/>
               <a:gd name="connsiteY4" fmla="*/ 0 h 18670"/>
+              <a:gd name="connsiteX0" fmla="*/ 0 w 21600"/>
+              <a:gd name="connsiteY0" fmla="*/ 0 h 18728"/>
+              <a:gd name="connsiteX1" fmla="*/ 21600 w 21600"/>
+              <a:gd name="connsiteY1" fmla="*/ 0 h 18728"/>
+              <a:gd name="connsiteX2" fmla="*/ 21600 w 21600"/>
+              <a:gd name="connsiteY2" fmla="*/ 17482 h 18728"/>
+              <a:gd name="connsiteX3" fmla="*/ 0 w 21600"/>
+              <a:gd name="connsiteY3" fmla="*/ 17472 h 18728"/>
+              <a:gd name="connsiteX4" fmla="*/ 0 w 21600"/>
+              <a:gd name="connsiteY4" fmla="*/ 0 h 18728"/>
+              <a:gd name="connsiteX0" fmla="*/ 0 w 21600"/>
+              <a:gd name="connsiteY0" fmla="*/ 0 h 18067"/>
+              <a:gd name="connsiteX1" fmla="*/ 21600 w 21600"/>
+              <a:gd name="connsiteY1" fmla="*/ 0 h 18067"/>
+              <a:gd name="connsiteX2" fmla="*/ 21600 w 21600"/>
+              <a:gd name="connsiteY2" fmla="*/ 17482 h 18067"/>
+              <a:gd name="connsiteX3" fmla="*/ 0 w 21600"/>
+              <a:gd name="connsiteY3" fmla="*/ 17472 h 18067"/>
+              <a:gd name="connsiteX4" fmla="*/ 0 w 21600"/>
+              <a:gd name="connsiteY4" fmla="*/ 0 h 18067"/>
+              <a:gd name="connsiteX0" fmla="*/ 0 w 21600"/>
+              <a:gd name="connsiteY0" fmla="*/ 0 h 17788"/>
+              <a:gd name="connsiteX1" fmla="*/ 21600 w 21600"/>
+              <a:gd name="connsiteY1" fmla="*/ 0 h 17788"/>
+              <a:gd name="connsiteX2" fmla="*/ 21600 w 21600"/>
+              <a:gd name="connsiteY2" fmla="*/ 17482 h 17788"/>
+              <a:gd name="connsiteX3" fmla="*/ 0 w 21600"/>
+              <a:gd name="connsiteY3" fmla="*/ 17472 h 17788"/>
+              <a:gd name="connsiteX4" fmla="*/ 0 w 21600"/>
+              <a:gd name="connsiteY4" fmla="*/ 0 h 17788"/>
+              <a:gd name="connsiteX0" fmla="*/ 0 w 21600"/>
+              <a:gd name="connsiteY0" fmla="*/ 0 h 17883"/>
+              <a:gd name="connsiteX1" fmla="*/ 21600 w 21600"/>
+              <a:gd name="connsiteY1" fmla="*/ 0 h 17883"/>
+              <a:gd name="connsiteX2" fmla="*/ 21600 w 21600"/>
+              <a:gd name="connsiteY2" fmla="*/ 17482 h 17883"/>
+              <a:gd name="connsiteX3" fmla="*/ 0 w 21600"/>
+              <a:gd name="connsiteY3" fmla="*/ 17472 h 17883"/>
+              <a:gd name="connsiteX4" fmla="*/ 0 w 21600"/>
+              <a:gd name="connsiteY4" fmla="*/ 0 h 17883"/>
             </a:gdLst>
             <a:ahLst/>
             <a:cxnLst>
@@ -3692,7 +4128,7 @@
             </a:cxnLst>
             <a:rect l="l" t="t" r="r" b="b"/>
             <a:pathLst>
-              <a:path w="21600" h="18670">
+              <a:path w="21600" h="17883">
                 <a:moveTo>
                   <a:pt x="0" y="0"/>
                 </a:moveTo>
@@ -3703,8 +4139,8 @@
                   <a:pt x="21600" y="17482"/>
                 </a:lnTo>
                 <a:cubicBezTo>
-                  <a:pt x="12916" y="14723"/>
-                  <a:pt x="10800" y="21222"/>
+                  <a:pt x="14839" y="16235"/>
+                  <a:pt x="7520" y="18846"/>
                   <a:pt x="0" y="17472"/>
                 </a:cubicBezTo>
                 <a:lnTo>
@@ -3746,10 +4182,671 @@
           </a:p>
         </p:txBody>
       </p:sp>
+      <p:sp>
+        <p:nvSpPr>
+          <p:cNvPr id="11" name="Fluxograma: Documento 3">
+            <a:extLst>
+              <a:ext uri="{FF2B5EF4-FFF2-40B4-BE49-F238E27FC236}">
+                <a16:creationId xmlns:a16="http://schemas.microsoft.com/office/drawing/2014/main" id="{D191ACDA-5042-4C2E-999A-060A5C518098}"/>
+              </a:ext>
+            </a:extLst>
+          </p:cNvPr>
+          <p:cNvSpPr/>
+          <p:nvPr/>
+        </p:nvSpPr>
+        <p:spPr>
+          <a:xfrm rot="10800000">
+            <a:off x="3636135" y="2760611"/>
+            <a:ext cx="2459864" cy="2132528"/>
+          </a:xfrm>
+          <a:custGeom>
+            <a:avLst/>
+            <a:gdLst>
+              <a:gd name="connsiteX0" fmla="*/ 0 w 21600"/>
+              <a:gd name="connsiteY0" fmla="*/ 0 h 21600"/>
+              <a:gd name="connsiteX1" fmla="*/ 21600 w 21600"/>
+              <a:gd name="connsiteY1" fmla="*/ 0 h 21600"/>
+              <a:gd name="connsiteX2" fmla="*/ 21600 w 21600"/>
+              <a:gd name="connsiteY2" fmla="*/ 17322 h 21600"/>
+              <a:gd name="connsiteX3" fmla="*/ 0 w 21600"/>
+              <a:gd name="connsiteY3" fmla="*/ 20172 h 21600"/>
+              <a:gd name="connsiteX4" fmla="*/ 0 w 21600"/>
+              <a:gd name="connsiteY4" fmla="*/ 0 h 21600"/>
+              <a:gd name="connsiteX0" fmla="*/ 0 w 21600"/>
+              <a:gd name="connsiteY0" fmla="*/ 0 h 19100"/>
+              <a:gd name="connsiteX1" fmla="*/ 21600 w 21600"/>
+              <a:gd name="connsiteY1" fmla="*/ 0 h 19100"/>
+              <a:gd name="connsiteX2" fmla="*/ 21600 w 21600"/>
+              <a:gd name="connsiteY2" fmla="*/ 17322 h 19100"/>
+              <a:gd name="connsiteX3" fmla="*/ 0 w 21600"/>
+              <a:gd name="connsiteY3" fmla="*/ 17472 h 19100"/>
+              <a:gd name="connsiteX4" fmla="*/ 0 w 21600"/>
+              <a:gd name="connsiteY4" fmla="*/ 0 h 19100"/>
+              <a:gd name="connsiteX0" fmla="*/ 0 w 21600"/>
+              <a:gd name="connsiteY0" fmla="*/ 0 h 18697"/>
+              <a:gd name="connsiteX1" fmla="*/ 21600 w 21600"/>
+              <a:gd name="connsiteY1" fmla="*/ 0 h 18697"/>
+              <a:gd name="connsiteX2" fmla="*/ 21600 w 21600"/>
+              <a:gd name="connsiteY2" fmla="*/ 17322 h 18697"/>
+              <a:gd name="connsiteX3" fmla="*/ 0 w 21600"/>
+              <a:gd name="connsiteY3" fmla="*/ 17472 h 18697"/>
+              <a:gd name="connsiteX4" fmla="*/ 0 w 21600"/>
+              <a:gd name="connsiteY4" fmla="*/ 0 h 18697"/>
+              <a:gd name="connsiteX0" fmla="*/ 0 w 21600"/>
+              <a:gd name="connsiteY0" fmla="*/ 0 h 18712"/>
+              <a:gd name="connsiteX1" fmla="*/ 21600 w 21600"/>
+              <a:gd name="connsiteY1" fmla="*/ 0 h 18712"/>
+              <a:gd name="connsiteX2" fmla="*/ 21600 w 21600"/>
+              <a:gd name="connsiteY2" fmla="*/ 17422 h 18712"/>
+              <a:gd name="connsiteX3" fmla="*/ 0 w 21600"/>
+              <a:gd name="connsiteY3" fmla="*/ 17472 h 18712"/>
+              <a:gd name="connsiteX4" fmla="*/ 0 w 21600"/>
+              <a:gd name="connsiteY4" fmla="*/ 0 h 18712"/>
+              <a:gd name="connsiteX0" fmla="*/ 0 w 21600"/>
+              <a:gd name="connsiteY0" fmla="*/ 0 h 18721"/>
+              <a:gd name="connsiteX1" fmla="*/ 21600 w 21600"/>
+              <a:gd name="connsiteY1" fmla="*/ 0 h 18721"/>
+              <a:gd name="connsiteX2" fmla="*/ 21600 w 21600"/>
+              <a:gd name="connsiteY2" fmla="*/ 17482 h 18721"/>
+              <a:gd name="connsiteX3" fmla="*/ 0 w 21600"/>
+              <a:gd name="connsiteY3" fmla="*/ 17472 h 18721"/>
+              <a:gd name="connsiteX4" fmla="*/ 0 w 21600"/>
+              <a:gd name="connsiteY4" fmla="*/ 0 h 18721"/>
+              <a:gd name="connsiteX0" fmla="*/ 0 w 21600"/>
+              <a:gd name="connsiteY0" fmla="*/ 0 h 18670"/>
+              <a:gd name="connsiteX1" fmla="*/ 21600 w 21600"/>
+              <a:gd name="connsiteY1" fmla="*/ 0 h 18670"/>
+              <a:gd name="connsiteX2" fmla="*/ 21600 w 21600"/>
+              <a:gd name="connsiteY2" fmla="*/ 17482 h 18670"/>
+              <a:gd name="connsiteX3" fmla="*/ 0 w 21600"/>
+              <a:gd name="connsiteY3" fmla="*/ 17472 h 18670"/>
+              <a:gd name="connsiteX4" fmla="*/ 0 w 21600"/>
+              <a:gd name="connsiteY4" fmla="*/ 0 h 18670"/>
+              <a:gd name="connsiteX0" fmla="*/ 0 w 21600"/>
+              <a:gd name="connsiteY0" fmla="*/ 0 h 18728"/>
+              <a:gd name="connsiteX1" fmla="*/ 21600 w 21600"/>
+              <a:gd name="connsiteY1" fmla="*/ 0 h 18728"/>
+              <a:gd name="connsiteX2" fmla="*/ 21600 w 21600"/>
+              <a:gd name="connsiteY2" fmla="*/ 17482 h 18728"/>
+              <a:gd name="connsiteX3" fmla="*/ 0 w 21600"/>
+              <a:gd name="connsiteY3" fmla="*/ 17472 h 18728"/>
+              <a:gd name="connsiteX4" fmla="*/ 0 w 21600"/>
+              <a:gd name="connsiteY4" fmla="*/ 0 h 18728"/>
+              <a:gd name="connsiteX0" fmla="*/ 0 w 21600"/>
+              <a:gd name="connsiteY0" fmla="*/ 0 h 18067"/>
+              <a:gd name="connsiteX1" fmla="*/ 21600 w 21600"/>
+              <a:gd name="connsiteY1" fmla="*/ 0 h 18067"/>
+              <a:gd name="connsiteX2" fmla="*/ 21600 w 21600"/>
+              <a:gd name="connsiteY2" fmla="*/ 17482 h 18067"/>
+              <a:gd name="connsiteX3" fmla="*/ 0 w 21600"/>
+              <a:gd name="connsiteY3" fmla="*/ 17472 h 18067"/>
+              <a:gd name="connsiteX4" fmla="*/ 0 w 21600"/>
+              <a:gd name="connsiteY4" fmla="*/ 0 h 18067"/>
+              <a:gd name="connsiteX0" fmla="*/ 0 w 21600"/>
+              <a:gd name="connsiteY0" fmla="*/ 0 h 17788"/>
+              <a:gd name="connsiteX1" fmla="*/ 21600 w 21600"/>
+              <a:gd name="connsiteY1" fmla="*/ 0 h 17788"/>
+              <a:gd name="connsiteX2" fmla="*/ 21600 w 21600"/>
+              <a:gd name="connsiteY2" fmla="*/ 17482 h 17788"/>
+              <a:gd name="connsiteX3" fmla="*/ 0 w 21600"/>
+              <a:gd name="connsiteY3" fmla="*/ 17472 h 17788"/>
+              <a:gd name="connsiteX4" fmla="*/ 0 w 21600"/>
+              <a:gd name="connsiteY4" fmla="*/ 0 h 17788"/>
+              <a:gd name="connsiteX0" fmla="*/ 0 w 21600"/>
+              <a:gd name="connsiteY0" fmla="*/ 0 h 17883"/>
+              <a:gd name="connsiteX1" fmla="*/ 21600 w 21600"/>
+              <a:gd name="connsiteY1" fmla="*/ 0 h 17883"/>
+              <a:gd name="connsiteX2" fmla="*/ 21600 w 21600"/>
+              <a:gd name="connsiteY2" fmla="*/ 17482 h 17883"/>
+              <a:gd name="connsiteX3" fmla="*/ 0 w 21600"/>
+              <a:gd name="connsiteY3" fmla="*/ 17472 h 17883"/>
+              <a:gd name="connsiteX4" fmla="*/ 0 w 21600"/>
+              <a:gd name="connsiteY4" fmla="*/ 0 h 17883"/>
+            </a:gdLst>
+            <a:ahLst/>
+            <a:cxnLst>
+              <a:cxn ang="0">
+                <a:pos x="connsiteX0" y="connsiteY0"/>
+              </a:cxn>
+              <a:cxn ang="0">
+                <a:pos x="connsiteX1" y="connsiteY1"/>
+              </a:cxn>
+              <a:cxn ang="0">
+                <a:pos x="connsiteX2" y="connsiteY2"/>
+              </a:cxn>
+              <a:cxn ang="0">
+                <a:pos x="connsiteX3" y="connsiteY3"/>
+              </a:cxn>
+              <a:cxn ang="0">
+                <a:pos x="connsiteX4" y="connsiteY4"/>
+              </a:cxn>
+            </a:cxnLst>
+            <a:rect l="l" t="t" r="r" b="b"/>
+            <a:pathLst>
+              <a:path w="21600" h="17883">
+                <a:moveTo>
+                  <a:pt x="0" y="0"/>
+                </a:moveTo>
+                <a:lnTo>
+                  <a:pt x="21600" y="0"/>
+                </a:lnTo>
+                <a:lnTo>
+                  <a:pt x="21600" y="17482"/>
+                </a:lnTo>
+                <a:cubicBezTo>
+                  <a:pt x="14839" y="16235"/>
+                  <a:pt x="7520" y="18846"/>
+                  <a:pt x="0" y="17472"/>
+                </a:cubicBezTo>
+                <a:lnTo>
+                  <a:pt x="0" y="0"/>
+                </a:lnTo>
+                <a:close/>
+              </a:path>
+            </a:pathLst>
+          </a:custGeom>
+          <a:solidFill>
+            <a:srgbClr val="FFC000"/>
+          </a:solidFill>
+          <a:ln>
+            <a:noFill/>
+          </a:ln>
+        </p:spPr>
+        <p:style>
+          <a:lnRef idx="2">
+            <a:schemeClr val="accent1">
+              <a:shade val="50000"/>
+            </a:schemeClr>
+          </a:lnRef>
+          <a:fillRef idx="1">
+            <a:schemeClr val="accent1"/>
+          </a:fillRef>
+          <a:effectRef idx="0">
+            <a:schemeClr val="accent1"/>
+          </a:effectRef>
+          <a:fontRef idx="minor">
+            <a:schemeClr val="lt1"/>
+          </a:fontRef>
+        </p:style>
+        <p:txBody>
+          <a:bodyPr rtlCol="0" anchor="ctr"/>
+          <a:lstStyle/>
+          <a:p>
+            <a:pPr algn="ctr"/>
+            <a:endParaRPr lang="pt-BR"/>
+          </a:p>
+        </p:txBody>
+      </p:sp>
+      <p:sp>
+        <p:nvSpPr>
+          <p:cNvPr id="12" name="Fluxograma: Documento 3">
+            <a:extLst>
+              <a:ext uri="{FF2B5EF4-FFF2-40B4-BE49-F238E27FC236}">
+                <a16:creationId xmlns:a16="http://schemas.microsoft.com/office/drawing/2014/main" id="{AB57D699-79E4-4344-ABFB-8D44055669E7}"/>
+              </a:ext>
+            </a:extLst>
+          </p:cNvPr>
+          <p:cNvSpPr/>
+          <p:nvPr/>
+        </p:nvSpPr>
+        <p:spPr>
+          <a:xfrm rot="10800000">
+            <a:off x="8560157" y="2760611"/>
+            <a:ext cx="2459864" cy="2132528"/>
+          </a:xfrm>
+          <a:custGeom>
+            <a:avLst/>
+            <a:gdLst>
+              <a:gd name="connsiteX0" fmla="*/ 0 w 21600"/>
+              <a:gd name="connsiteY0" fmla="*/ 0 h 21600"/>
+              <a:gd name="connsiteX1" fmla="*/ 21600 w 21600"/>
+              <a:gd name="connsiteY1" fmla="*/ 0 h 21600"/>
+              <a:gd name="connsiteX2" fmla="*/ 21600 w 21600"/>
+              <a:gd name="connsiteY2" fmla="*/ 17322 h 21600"/>
+              <a:gd name="connsiteX3" fmla="*/ 0 w 21600"/>
+              <a:gd name="connsiteY3" fmla="*/ 20172 h 21600"/>
+              <a:gd name="connsiteX4" fmla="*/ 0 w 21600"/>
+              <a:gd name="connsiteY4" fmla="*/ 0 h 21600"/>
+              <a:gd name="connsiteX0" fmla="*/ 0 w 21600"/>
+              <a:gd name="connsiteY0" fmla="*/ 0 h 19100"/>
+              <a:gd name="connsiteX1" fmla="*/ 21600 w 21600"/>
+              <a:gd name="connsiteY1" fmla="*/ 0 h 19100"/>
+              <a:gd name="connsiteX2" fmla="*/ 21600 w 21600"/>
+              <a:gd name="connsiteY2" fmla="*/ 17322 h 19100"/>
+              <a:gd name="connsiteX3" fmla="*/ 0 w 21600"/>
+              <a:gd name="connsiteY3" fmla="*/ 17472 h 19100"/>
+              <a:gd name="connsiteX4" fmla="*/ 0 w 21600"/>
+              <a:gd name="connsiteY4" fmla="*/ 0 h 19100"/>
+              <a:gd name="connsiteX0" fmla="*/ 0 w 21600"/>
+              <a:gd name="connsiteY0" fmla="*/ 0 h 18697"/>
+              <a:gd name="connsiteX1" fmla="*/ 21600 w 21600"/>
+              <a:gd name="connsiteY1" fmla="*/ 0 h 18697"/>
+              <a:gd name="connsiteX2" fmla="*/ 21600 w 21600"/>
+              <a:gd name="connsiteY2" fmla="*/ 17322 h 18697"/>
+              <a:gd name="connsiteX3" fmla="*/ 0 w 21600"/>
+              <a:gd name="connsiteY3" fmla="*/ 17472 h 18697"/>
+              <a:gd name="connsiteX4" fmla="*/ 0 w 21600"/>
+              <a:gd name="connsiteY4" fmla="*/ 0 h 18697"/>
+              <a:gd name="connsiteX0" fmla="*/ 0 w 21600"/>
+              <a:gd name="connsiteY0" fmla="*/ 0 h 18712"/>
+              <a:gd name="connsiteX1" fmla="*/ 21600 w 21600"/>
+              <a:gd name="connsiteY1" fmla="*/ 0 h 18712"/>
+              <a:gd name="connsiteX2" fmla="*/ 21600 w 21600"/>
+              <a:gd name="connsiteY2" fmla="*/ 17422 h 18712"/>
+              <a:gd name="connsiteX3" fmla="*/ 0 w 21600"/>
+              <a:gd name="connsiteY3" fmla="*/ 17472 h 18712"/>
+              <a:gd name="connsiteX4" fmla="*/ 0 w 21600"/>
+              <a:gd name="connsiteY4" fmla="*/ 0 h 18712"/>
+              <a:gd name="connsiteX0" fmla="*/ 0 w 21600"/>
+              <a:gd name="connsiteY0" fmla="*/ 0 h 18721"/>
+              <a:gd name="connsiteX1" fmla="*/ 21600 w 21600"/>
+              <a:gd name="connsiteY1" fmla="*/ 0 h 18721"/>
+              <a:gd name="connsiteX2" fmla="*/ 21600 w 21600"/>
+              <a:gd name="connsiteY2" fmla="*/ 17482 h 18721"/>
+              <a:gd name="connsiteX3" fmla="*/ 0 w 21600"/>
+              <a:gd name="connsiteY3" fmla="*/ 17472 h 18721"/>
+              <a:gd name="connsiteX4" fmla="*/ 0 w 21600"/>
+              <a:gd name="connsiteY4" fmla="*/ 0 h 18721"/>
+              <a:gd name="connsiteX0" fmla="*/ 0 w 21600"/>
+              <a:gd name="connsiteY0" fmla="*/ 0 h 18670"/>
+              <a:gd name="connsiteX1" fmla="*/ 21600 w 21600"/>
+              <a:gd name="connsiteY1" fmla="*/ 0 h 18670"/>
+              <a:gd name="connsiteX2" fmla="*/ 21600 w 21600"/>
+              <a:gd name="connsiteY2" fmla="*/ 17482 h 18670"/>
+              <a:gd name="connsiteX3" fmla="*/ 0 w 21600"/>
+              <a:gd name="connsiteY3" fmla="*/ 17472 h 18670"/>
+              <a:gd name="connsiteX4" fmla="*/ 0 w 21600"/>
+              <a:gd name="connsiteY4" fmla="*/ 0 h 18670"/>
+              <a:gd name="connsiteX0" fmla="*/ 0 w 21600"/>
+              <a:gd name="connsiteY0" fmla="*/ 0 h 18728"/>
+              <a:gd name="connsiteX1" fmla="*/ 21600 w 21600"/>
+              <a:gd name="connsiteY1" fmla="*/ 0 h 18728"/>
+              <a:gd name="connsiteX2" fmla="*/ 21600 w 21600"/>
+              <a:gd name="connsiteY2" fmla="*/ 17482 h 18728"/>
+              <a:gd name="connsiteX3" fmla="*/ 0 w 21600"/>
+              <a:gd name="connsiteY3" fmla="*/ 17472 h 18728"/>
+              <a:gd name="connsiteX4" fmla="*/ 0 w 21600"/>
+              <a:gd name="connsiteY4" fmla="*/ 0 h 18728"/>
+              <a:gd name="connsiteX0" fmla="*/ 0 w 21600"/>
+              <a:gd name="connsiteY0" fmla="*/ 0 h 18067"/>
+              <a:gd name="connsiteX1" fmla="*/ 21600 w 21600"/>
+              <a:gd name="connsiteY1" fmla="*/ 0 h 18067"/>
+              <a:gd name="connsiteX2" fmla="*/ 21600 w 21600"/>
+              <a:gd name="connsiteY2" fmla="*/ 17482 h 18067"/>
+              <a:gd name="connsiteX3" fmla="*/ 0 w 21600"/>
+              <a:gd name="connsiteY3" fmla="*/ 17472 h 18067"/>
+              <a:gd name="connsiteX4" fmla="*/ 0 w 21600"/>
+              <a:gd name="connsiteY4" fmla="*/ 0 h 18067"/>
+              <a:gd name="connsiteX0" fmla="*/ 0 w 21600"/>
+              <a:gd name="connsiteY0" fmla="*/ 0 h 17788"/>
+              <a:gd name="connsiteX1" fmla="*/ 21600 w 21600"/>
+              <a:gd name="connsiteY1" fmla="*/ 0 h 17788"/>
+              <a:gd name="connsiteX2" fmla="*/ 21600 w 21600"/>
+              <a:gd name="connsiteY2" fmla="*/ 17482 h 17788"/>
+              <a:gd name="connsiteX3" fmla="*/ 0 w 21600"/>
+              <a:gd name="connsiteY3" fmla="*/ 17472 h 17788"/>
+              <a:gd name="connsiteX4" fmla="*/ 0 w 21600"/>
+              <a:gd name="connsiteY4" fmla="*/ 0 h 17788"/>
+              <a:gd name="connsiteX0" fmla="*/ 0 w 21600"/>
+              <a:gd name="connsiteY0" fmla="*/ 0 h 17883"/>
+              <a:gd name="connsiteX1" fmla="*/ 21600 w 21600"/>
+              <a:gd name="connsiteY1" fmla="*/ 0 h 17883"/>
+              <a:gd name="connsiteX2" fmla="*/ 21600 w 21600"/>
+              <a:gd name="connsiteY2" fmla="*/ 17482 h 17883"/>
+              <a:gd name="connsiteX3" fmla="*/ 0 w 21600"/>
+              <a:gd name="connsiteY3" fmla="*/ 17472 h 17883"/>
+              <a:gd name="connsiteX4" fmla="*/ 0 w 21600"/>
+              <a:gd name="connsiteY4" fmla="*/ 0 h 17883"/>
+            </a:gdLst>
+            <a:ahLst/>
+            <a:cxnLst>
+              <a:cxn ang="0">
+                <a:pos x="connsiteX0" y="connsiteY0"/>
+              </a:cxn>
+              <a:cxn ang="0">
+                <a:pos x="connsiteX1" y="connsiteY1"/>
+              </a:cxn>
+              <a:cxn ang="0">
+                <a:pos x="connsiteX2" y="connsiteY2"/>
+              </a:cxn>
+              <a:cxn ang="0">
+                <a:pos x="connsiteX3" y="connsiteY3"/>
+              </a:cxn>
+              <a:cxn ang="0">
+                <a:pos x="connsiteX4" y="connsiteY4"/>
+              </a:cxn>
+            </a:cxnLst>
+            <a:rect l="l" t="t" r="r" b="b"/>
+            <a:pathLst>
+              <a:path w="21600" h="17883">
+                <a:moveTo>
+                  <a:pt x="0" y="0"/>
+                </a:moveTo>
+                <a:lnTo>
+                  <a:pt x="21600" y="0"/>
+                </a:lnTo>
+                <a:lnTo>
+                  <a:pt x="21600" y="17482"/>
+                </a:lnTo>
+                <a:cubicBezTo>
+                  <a:pt x="14839" y="16235"/>
+                  <a:pt x="7520" y="18846"/>
+                  <a:pt x="0" y="17472"/>
+                </a:cubicBezTo>
+                <a:lnTo>
+                  <a:pt x="0" y="0"/>
+                </a:lnTo>
+                <a:close/>
+              </a:path>
+            </a:pathLst>
+          </a:custGeom>
+          <a:solidFill>
+            <a:srgbClr val="C00000"/>
+          </a:solidFill>
+          <a:ln>
+            <a:noFill/>
+          </a:ln>
+        </p:spPr>
+        <p:style>
+          <a:lnRef idx="2">
+            <a:schemeClr val="accent1">
+              <a:shade val="50000"/>
+            </a:schemeClr>
+          </a:lnRef>
+          <a:fillRef idx="1">
+            <a:schemeClr val="accent1"/>
+          </a:fillRef>
+          <a:effectRef idx="0">
+            <a:schemeClr val="accent1"/>
+          </a:effectRef>
+          <a:fontRef idx="minor">
+            <a:schemeClr val="lt1"/>
+          </a:fontRef>
+        </p:style>
+        <p:txBody>
+          <a:bodyPr rtlCol="0" anchor="ctr"/>
+          <a:lstStyle/>
+          <a:p>
+            <a:pPr algn="ctr"/>
+            <a:endParaRPr lang="pt-BR"/>
+          </a:p>
+        </p:txBody>
+      </p:sp>
+      <p:sp>
+        <p:nvSpPr>
+          <p:cNvPr id="13" name="Fluxograma: Documento 3">
+            <a:extLst>
+              <a:ext uri="{FF2B5EF4-FFF2-40B4-BE49-F238E27FC236}">
+                <a16:creationId xmlns:a16="http://schemas.microsoft.com/office/drawing/2014/main" id="{A072B85D-AB13-4D48-8A40-3047343A6FDB}"/>
+              </a:ext>
+            </a:extLst>
+          </p:cNvPr>
+          <p:cNvSpPr/>
+          <p:nvPr/>
+        </p:nvSpPr>
+        <p:spPr>
+          <a:xfrm rot="10800000">
+            <a:off x="1174124" y="2760611"/>
+            <a:ext cx="2459864" cy="2132528"/>
+          </a:xfrm>
+          <a:custGeom>
+            <a:avLst/>
+            <a:gdLst>
+              <a:gd name="connsiteX0" fmla="*/ 0 w 21600"/>
+              <a:gd name="connsiteY0" fmla="*/ 0 h 21600"/>
+              <a:gd name="connsiteX1" fmla="*/ 21600 w 21600"/>
+              <a:gd name="connsiteY1" fmla="*/ 0 h 21600"/>
+              <a:gd name="connsiteX2" fmla="*/ 21600 w 21600"/>
+              <a:gd name="connsiteY2" fmla="*/ 17322 h 21600"/>
+              <a:gd name="connsiteX3" fmla="*/ 0 w 21600"/>
+              <a:gd name="connsiteY3" fmla="*/ 20172 h 21600"/>
+              <a:gd name="connsiteX4" fmla="*/ 0 w 21600"/>
+              <a:gd name="connsiteY4" fmla="*/ 0 h 21600"/>
+              <a:gd name="connsiteX0" fmla="*/ 0 w 21600"/>
+              <a:gd name="connsiteY0" fmla="*/ 0 h 19100"/>
+              <a:gd name="connsiteX1" fmla="*/ 21600 w 21600"/>
+              <a:gd name="connsiteY1" fmla="*/ 0 h 19100"/>
+              <a:gd name="connsiteX2" fmla="*/ 21600 w 21600"/>
+              <a:gd name="connsiteY2" fmla="*/ 17322 h 19100"/>
+              <a:gd name="connsiteX3" fmla="*/ 0 w 21600"/>
+              <a:gd name="connsiteY3" fmla="*/ 17472 h 19100"/>
+              <a:gd name="connsiteX4" fmla="*/ 0 w 21600"/>
+              <a:gd name="connsiteY4" fmla="*/ 0 h 19100"/>
+              <a:gd name="connsiteX0" fmla="*/ 0 w 21600"/>
+              <a:gd name="connsiteY0" fmla="*/ 0 h 18697"/>
+              <a:gd name="connsiteX1" fmla="*/ 21600 w 21600"/>
+              <a:gd name="connsiteY1" fmla="*/ 0 h 18697"/>
+              <a:gd name="connsiteX2" fmla="*/ 21600 w 21600"/>
+              <a:gd name="connsiteY2" fmla="*/ 17322 h 18697"/>
+              <a:gd name="connsiteX3" fmla="*/ 0 w 21600"/>
+              <a:gd name="connsiteY3" fmla="*/ 17472 h 18697"/>
+              <a:gd name="connsiteX4" fmla="*/ 0 w 21600"/>
+              <a:gd name="connsiteY4" fmla="*/ 0 h 18697"/>
+              <a:gd name="connsiteX0" fmla="*/ 0 w 21600"/>
+              <a:gd name="connsiteY0" fmla="*/ 0 h 18712"/>
+              <a:gd name="connsiteX1" fmla="*/ 21600 w 21600"/>
+              <a:gd name="connsiteY1" fmla="*/ 0 h 18712"/>
+              <a:gd name="connsiteX2" fmla="*/ 21600 w 21600"/>
+              <a:gd name="connsiteY2" fmla="*/ 17422 h 18712"/>
+              <a:gd name="connsiteX3" fmla="*/ 0 w 21600"/>
+              <a:gd name="connsiteY3" fmla="*/ 17472 h 18712"/>
+              <a:gd name="connsiteX4" fmla="*/ 0 w 21600"/>
+              <a:gd name="connsiteY4" fmla="*/ 0 h 18712"/>
+              <a:gd name="connsiteX0" fmla="*/ 0 w 21600"/>
+              <a:gd name="connsiteY0" fmla="*/ 0 h 18721"/>
+              <a:gd name="connsiteX1" fmla="*/ 21600 w 21600"/>
+              <a:gd name="connsiteY1" fmla="*/ 0 h 18721"/>
+              <a:gd name="connsiteX2" fmla="*/ 21600 w 21600"/>
+              <a:gd name="connsiteY2" fmla="*/ 17482 h 18721"/>
+              <a:gd name="connsiteX3" fmla="*/ 0 w 21600"/>
+              <a:gd name="connsiteY3" fmla="*/ 17472 h 18721"/>
+              <a:gd name="connsiteX4" fmla="*/ 0 w 21600"/>
+              <a:gd name="connsiteY4" fmla="*/ 0 h 18721"/>
+              <a:gd name="connsiteX0" fmla="*/ 0 w 21600"/>
+              <a:gd name="connsiteY0" fmla="*/ 0 h 18670"/>
+              <a:gd name="connsiteX1" fmla="*/ 21600 w 21600"/>
+              <a:gd name="connsiteY1" fmla="*/ 0 h 18670"/>
+              <a:gd name="connsiteX2" fmla="*/ 21600 w 21600"/>
+              <a:gd name="connsiteY2" fmla="*/ 17482 h 18670"/>
+              <a:gd name="connsiteX3" fmla="*/ 0 w 21600"/>
+              <a:gd name="connsiteY3" fmla="*/ 17472 h 18670"/>
+              <a:gd name="connsiteX4" fmla="*/ 0 w 21600"/>
+              <a:gd name="connsiteY4" fmla="*/ 0 h 18670"/>
+              <a:gd name="connsiteX0" fmla="*/ 0 w 21600"/>
+              <a:gd name="connsiteY0" fmla="*/ 0 h 18728"/>
+              <a:gd name="connsiteX1" fmla="*/ 21600 w 21600"/>
+              <a:gd name="connsiteY1" fmla="*/ 0 h 18728"/>
+              <a:gd name="connsiteX2" fmla="*/ 21600 w 21600"/>
+              <a:gd name="connsiteY2" fmla="*/ 17482 h 18728"/>
+              <a:gd name="connsiteX3" fmla="*/ 0 w 21600"/>
+              <a:gd name="connsiteY3" fmla="*/ 17472 h 18728"/>
+              <a:gd name="connsiteX4" fmla="*/ 0 w 21600"/>
+              <a:gd name="connsiteY4" fmla="*/ 0 h 18728"/>
+              <a:gd name="connsiteX0" fmla="*/ 0 w 21600"/>
+              <a:gd name="connsiteY0" fmla="*/ 0 h 18067"/>
+              <a:gd name="connsiteX1" fmla="*/ 21600 w 21600"/>
+              <a:gd name="connsiteY1" fmla="*/ 0 h 18067"/>
+              <a:gd name="connsiteX2" fmla="*/ 21600 w 21600"/>
+              <a:gd name="connsiteY2" fmla="*/ 17482 h 18067"/>
+              <a:gd name="connsiteX3" fmla="*/ 0 w 21600"/>
+              <a:gd name="connsiteY3" fmla="*/ 17472 h 18067"/>
+              <a:gd name="connsiteX4" fmla="*/ 0 w 21600"/>
+              <a:gd name="connsiteY4" fmla="*/ 0 h 18067"/>
+              <a:gd name="connsiteX0" fmla="*/ 0 w 21600"/>
+              <a:gd name="connsiteY0" fmla="*/ 0 h 17788"/>
+              <a:gd name="connsiteX1" fmla="*/ 21600 w 21600"/>
+              <a:gd name="connsiteY1" fmla="*/ 0 h 17788"/>
+              <a:gd name="connsiteX2" fmla="*/ 21600 w 21600"/>
+              <a:gd name="connsiteY2" fmla="*/ 17482 h 17788"/>
+              <a:gd name="connsiteX3" fmla="*/ 0 w 21600"/>
+              <a:gd name="connsiteY3" fmla="*/ 17472 h 17788"/>
+              <a:gd name="connsiteX4" fmla="*/ 0 w 21600"/>
+              <a:gd name="connsiteY4" fmla="*/ 0 h 17788"/>
+              <a:gd name="connsiteX0" fmla="*/ 0 w 21600"/>
+              <a:gd name="connsiteY0" fmla="*/ 0 h 17883"/>
+              <a:gd name="connsiteX1" fmla="*/ 21600 w 21600"/>
+              <a:gd name="connsiteY1" fmla="*/ 0 h 17883"/>
+              <a:gd name="connsiteX2" fmla="*/ 21600 w 21600"/>
+              <a:gd name="connsiteY2" fmla="*/ 17482 h 17883"/>
+              <a:gd name="connsiteX3" fmla="*/ 0 w 21600"/>
+              <a:gd name="connsiteY3" fmla="*/ 17472 h 17883"/>
+              <a:gd name="connsiteX4" fmla="*/ 0 w 21600"/>
+              <a:gd name="connsiteY4" fmla="*/ 0 h 17883"/>
+            </a:gdLst>
+            <a:ahLst/>
+            <a:cxnLst>
+              <a:cxn ang="0">
+                <a:pos x="connsiteX0" y="connsiteY0"/>
+              </a:cxn>
+              <a:cxn ang="0">
+                <a:pos x="connsiteX1" y="connsiteY1"/>
+              </a:cxn>
+              <a:cxn ang="0">
+                <a:pos x="connsiteX2" y="connsiteY2"/>
+              </a:cxn>
+              <a:cxn ang="0">
+                <a:pos x="connsiteX3" y="connsiteY3"/>
+              </a:cxn>
+              <a:cxn ang="0">
+                <a:pos x="connsiteX4" y="connsiteY4"/>
+              </a:cxn>
+            </a:cxnLst>
+            <a:rect l="l" t="t" r="r" b="b"/>
+            <a:pathLst>
+              <a:path w="21600" h="17883">
+                <a:moveTo>
+                  <a:pt x="0" y="0"/>
+                </a:moveTo>
+                <a:lnTo>
+                  <a:pt x="21600" y="0"/>
+                </a:lnTo>
+                <a:lnTo>
+                  <a:pt x="21600" y="17482"/>
+                </a:lnTo>
+                <a:cubicBezTo>
+                  <a:pt x="14839" y="16235"/>
+                  <a:pt x="7520" y="18846"/>
+                  <a:pt x="0" y="17472"/>
+                </a:cubicBezTo>
+                <a:lnTo>
+                  <a:pt x="0" y="0"/>
+                </a:lnTo>
+                <a:close/>
+              </a:path>
+            </a:pathLst>
+          </a:custGeom>
+          <a:solidFill>
+            <a:schemeClr val="bg1"/>
+          </a:solidFill>
+          <a:ln>
+            <a:noFill/>
+          </a:ln>
+        </p:spPr>
+        <p:style>
+          <a:lnRef idx="2">
+            <a:schemeClr val="accent1">
+              <a:shade val="50000"/>
+            </a:schemeClr>
+          </a:lnRef>
+          <a:fillRef idx="1">
+            <a:schemeClr val="accent1"/>
+          </a:fillRef>
+          <a:effectRef idx="0">
+            <a:schemeClr val="accent1"/>
+          </a:effectRef>
+          <a:fontRef idx="minor">
+            <a:schemeClr val="lt1"/>
+          </a:fontRef>
+        </p:style>
+        <p:txBody>
+          <a:bodyPr rtlCol="0" anchor="ctr"/>
+          <a:lstStyle/>
+          <a:p>
+            <a:pPr algn="ctr"/>
+            <a:endParaRPr lang="pt-BR"/>
+          </a:p>
+        </p:txBody>
+      </p:sp>
     </p:spTree>
     <p:extLst>
       <p:ext uri="{BB962C8B-B14F-4D97-AF65-F5344CB8AC3E}">
         <p14:creationId xmlns:p14="http://schemas.microsoft.com/office/powerpoint/2010/main" val="4005772259"/>
+      </p:ext>
+    </p:extLst>
+  </p:cSld>
+  <p:clrMapOvr>
+    <a:masterClrMapping/>
+  </p:clrMapOvr>
+</p:sld>
+</file>
+
+<file path=ppt/slides/slide2.xml><?xml version="1.0" encoding="utf-8"?>
+<p:sld xmlns:a="http://schemas.openxmlformats.org/drawingml/2006/main" xmlns:r="http://schemas.openxmlformats.org/officeDocument/2006/relationships" xmlns:p="http://schemas.openxmlformats.org/presentationml/2006/main">
+  <p:cSld>
+    <p:spTree>
+      <p:nvGrpSpPr>
+        <p:cNvPr id="1" name=""/>
+        <p:cNvGrpSpPr/>
+        <p:nvPr/>
+      </p:nvGrpSpPr>
+      <p:grpSpPr>
+        <a:xfrm>
+          <a:off x="0" y="0"/>
+          <a:ext cx="0" cy="0"/>
+          <a:chOff x="0" y="0"/>
+          <a:chExt cx="0" cy="0"/>
+        </a:xfrm>
+      </p:grpSpPr>
+      <p:pic>
+        <p:nvPicPr>
+          <p:cNvPr id="5" name="Imagem 4" descr="Uma imagem contendo avião&#10;&#10;Descrição gerada automaticamente">
+            <a:extLst>
+              <a:ext uri="{FF2B5EF4-FFF2-40B4-BE49-F238E27FC236}">
+                <a16:creationId xmlns:a16="http://schemas.microsoft.com/office/drawing/2014/main" id="{A2231A2D-D88F-43AB-B10C-7A142B25593A}"/>
+              </a:ext>
+            </a:extLst>
+          </p:cNvPr>
+          <p:cNvPicPr>
+            <a:picLocks noChangeAspect="1"/>
+          </p:cNvPicPr>
+          <p:nvPr/>
+        </p:nvPicPr>
+        <p:blipFill>
+          <a:blip r:embed="rId2">
+            <a:clrChange>
+              <a:clrFrom>
+                <a:srgbClr val="FFFFFF"/>
+              </a:clrFrom>
+              <a:clrTo>
+                <a:srgbClr val="FFFFFF">
+                  <a:alpha val="0"/>
+                </a:srgbClr>
+              </a:clrTo>
+            </a:clrChange>
+            <a:extLst>
+              <a:ext uri="{28A0092B-C50C-407E-A947-70E740481C1C}">
+                <a14:useLocalDpi xmlns:a14="http://schemas.microsoft.com/office/drawing/2010/main" val="0"/>
+              </a:ext>
+            </a:extLst>
+          </a:blip>
+          <a:stretch>
+            <a:fillRect/>
+          </a:stretch>
+        </p:blipFill>
+        <p:spPr>
+          <a:xfrm>
+            <a:off x="4846063" y="3671403"/>
+            <a:ext cx="622829" cy="622829"/>
+          </a:xfrm>
+          <a:prstGeom prst="rect">
+            <a:avLst/>
+          </a:prstGeom>
+        </p:spPr>
+      </p:pic>
+    </p:spTree>
+    <p:extLst>
+      <p:ext uri="{BB962C8B-B14F-4D97-AF65-F5344CB8AC3E}">
+        <p14:creationId xmlns:p14="http://schemas.microsoft.com/office/powerpoint/2010/main" val="2240349029"/>
       </p:ext>
     </p:extLst>
   </p:cSld>

</xml_diff>